<commit_message>
Modified powerpoint and image
</commit_message>
<xml_diff>
--- a/docs/deployment_guide/images/architecture_diagram.pptx
+++ b/docs/deployment_guide/images/architecture_diagram.pptx
@@ -106,7 +106,18 @@
   </p:defaultTextStyle>
   <p:extLst>
     <p:ext uri="{EFAFB233-063F-42B5-8137-9DF3F51BA10A}">
-      <p15:sldGuideLst xmlns:p15="http://schemas.microsoft.com/office/powerpoint/2012/main"/>
+      <p15:sldGuideLst xmlns:p15="http://schemas.microsoft.com/office/powerpoint/2012/main">
+        <p15:guide id="1" orient="horz" pos="4896" userDrawn="1">
+          <p15:clr>
+            <a:srgbClr val="A4A3A4"/>
+          </p15:clr>
+        </p15:guide>
+        <p15:guide id="2" pos="4896" userDrawn="1">
+          <p15:clr>
+            <a:srgbClr val="A4A3A4"/>
+          </p15:clr>
+        </p15:guide>
+      </p15:sldGuideLst>
     </p:ext>
   </p:extLst>
 </p:presentation>
@@ -243,7 +254,7 @@
           <a:p>
             <a:fld id="{94264ADC-8C69-46B9-9183-D53300F41D68}" type="datetimeFigureOut">
               <a:rPr lang="en-US" smtClean="0"/>
-              <a:t>2022-09-23</a:t>
+              <a:t>11/2/2022</a:t>
             </a:fld>
             <a:endParaRPr lang="en-US"/>
           </a:p>
@@ -413,7 +424,7 @@
           <a:p>
             <a:fld id="{94264ADC-8C69-46B9-9183-D53300F41D68}" type="datetimeFigureOut">
               <a:rPr lang="en-US" smtClean="0"/>
-              <a:t>2022-09-23</a:t>
+              <a:t>11/2/2022</a:t>
             </a:fld>
             <a:endParaRPr lang="en-US"/>
           </a:p>
@@ -593,7 +604,7 @@
           <a:p>
             <a:fld id="{94264ADC-8C69-46B9-9183-D53300F41D68}" type="datetimeFigureOut">
               <a:rPr lang="en-US" smtClean="0"/>
-              <a:t>2022-09-23</a:t>
+              <a:t>11/2/2022</a:t>
             </a:fld>
             <a:endParaRPr lang="en-US"/>
           </a:p>
@@ -763,7 +774,7 @@
           <a:p>
             <a:fld id="{94264ADC-8C69-46B9-9183-D53300F41D68}" type="datetimeFigureOut">
               <a:rPr lang="en-US" smtClean="0"/>
-              <a:t>2022-09-23</a:t>
+              <a:t>11/2/2022</a:t>
             </a:fld>
             <a:endParaRPr lang="en-US"/>
           </a:p>
@@ -1007,7 +1018,7 @@
           <a:p>
             <a:fld id="{94264ADC-8C69-46B9-9183-D53300F41D68}" type="datetimeFigureOut">
               <a:rPr lang="en-US" smtClean="0"/>
-              <a:t>2022-09-23</a:t>
+              <a:t>11/2/2022</a:t>
             </a:fld>
             <a:endParaRPr lang="en-US"/>
           </a:p>
@@ -1239,7 +1250,7 @@
           <a:p>
             <a:fld id="{94264ADC-8C69-46B9-9183-D53300F41D68}" type="datetimeFigureOut">
               <a:rPr lang="en-US" smtClean="0"/>
-              <a:t>2022-09-23</a:t>
+              <a:t>11/2/2022</a:t>
             </a:fld>
             <a:endParaRPr lang="en-US"/>
           </a:p>
@@ -1606,7 +1617,7 @@
           <a:p>
             <a:fld id="{94264ADC-8C69-46B9-9183-D53300F41D68}" type="datetimeFigureOut">
               <a:rPr lang="en-US" smtClean="0"/>
-              <a:t>2022-09-23</a:t>
+              <a:t>11/2/2022</a:t>
             </a:fld>
             <a:endParaRPr lang="en-US"/>
           </a:p>
@@ -1724,7 +1735,7 @@
           <a:p>
             <a:fld id="{94264ADC-8C69-46B9-9183-D53300F41D68}" type="datetimeFigureOut">
               <a:rPr lang="en-US" smtClean="0"/>
-              <a:t>2022-09-23</a:t>
+              <a:t>11/2/2022</a:t>
             </a:fld>
             <a:endParaRPr lang="en-US"/>
           </a:p>
@@ -1819,7 +1830,7 @@
           <a:p>
             <a:fld id="{94264ADC-8C69-46B9-9183-D53300F41D68}" type="datetimeFigureOut">
               <a:rPr lang="en-US" smtClean="0"/>
-              <a:t>2022-09-23</a:t>
+              <a:t>11/2/2022</a:t>
             </a:fld>
             <a:endParaRPr lang="en-US"/>
           </a:p>
@@ -2096,7 +2107,7 @@
           <a:p>
             <a:fld id="{94264ADC-8C69-46B9-9183-D53300F41D68}" type="datetimeFigureOut">
               <a:rPr lang="en-US" smtClean="0"/>
-              <a:t>2022-09-23</a:t>
+              <a:t>11/2/2022</a:t>
             </a:fld>
             <a:endParaRPr lang="en-US"/>
           </a:p>
@@ -2353,7 +2364,7 @@
           <a:p>
             <a:fld id="{94264ADC-8C69-46B9-9183-D53300F41D68}" type="datetimeFigureOut">
               <a:rPr lang="en-US" smtClean="0"/>
-              <a:t>2022-09-23</a:t>
+              <a:t>11/2/2022</a:t>
             </a:fld>
             <a:endParaRPr lang="en-US"/>
           </a:p>
@@ -2566,7 +2577,7 @@
           <a:p>
             <a:fld id="{94264ADC-8C69-46B9-9183-D53300F41D68}" type="datetimeFigureOut">
               <a:rPr lang="en-US" smtClean="0"/>
-              <a:t>2022-09-23</a:t>
+              <a:t>11/2/2022</a:t>
             </a:fld>
             <a:endParaRPr lang="en-US"/>
           </a:p>
@@ -7262,20 +7273,12 @@
           <a:p>
             <a:pPr algn="ctr" eaLnBrk="1" hangingPunct="1"/>
             <a:r>
-              <a:rPr lang="en-US" altLang="en-US" sz="1100" dirty="0" err="1">
-                <a:latin typeface="Arial" panose="020B0604020202020204" pitchFamily="34" charset="0"/>
-                <a:ea typeface="Amazon Ember" panose="020B0603020204020204" pitchFamily="34" charset="0"/>
-                <a:cs typeface="Arial" panose="020B0604020202020204" pitchFamily="34" charset="0"/>
-              </a:rPr>
-              <a:t>Praefect</a:t>
-            </a:r>
-            <a:r>
               <a:rPr lang="en-US" altLang="en-US" sz="1100" dirty="0">
                 <a:latin typeface="Arial" panose="020B0604020202020204" pitchFamily="34" charset="0"/>
                 <a:ea typeface="Amazon Ember" panose="020B0603020204020204" pitchFamily="34" charset="0"/>
                 <a:cs typeface="Arial" panose="020B0604020202020204" pitchFamily="34" charset="0"/>
               </a:rPr>
-              <a:t> instance</a:t>
+              <a:t>Praefect instance</a:t>
             </a:r>
           </a:p>
         </p:txBody>
@@ -7491,20 +7494,12 @@
           <a:p>
             <a:pPr algn="ctr" eaLnBrk="1" hangingPunct="1"/>
             <a:r>
-              <a:rPr lang="en-US" altLang="en-US" sz="1100" dirty="0" err="1">
-                <a:latin typeface="Arial" panose="020B0604020202020204" pitchFamily="34" charset="0"/>
-                <a:ea typeface="Amazon Ember" panose="020B0603020204020204" pitchFamily="34" charset="0"/>
-                <a:cs typeface="Arial" panose="020B0604020202020204" pitchFamily="34" charset="0"/>
-              </a:rPr>
-              <a:t>Praefect</a:t>
-            </a:r>
-            <a:r>
               <a:rPr lang="en-US" altLang="en-US" sz="1100" dirty="0">
                 <a:latin typeface="Arial" panose="020B0604020202020204" pitchFamily="34" charset="0"/>
                 <a:ea typeface="Amazon Ember" panose="020B0603020204020204" pitchFamily="34" charset="0"/>
                 <a:cs typeface="Arial" panose="020B0604020202020204" pitchFamily="34" charset="0"/>
               </a:rPr>
-              <a:t> instance</a:t>
+              <a:t>Praefect instance</a:t>
             </a:r>
           </a:p>
         </p:txBody>
@@ -7862,20 +7857,12 @@
           <a:p>
             <a:pPr algn="ctr" eaLnBrk="1" hangingPunct="1"/>
             <a:r>
-              <a:rPr lang="en-US" altLang="en-US" sz="1100" dirty="0" err="1">
-                <a:latin typeface="Arial" panose="020B0604020202020204" pitchFamily="34" charset="0"/>
-                <a:ea typeface="Amazon Ember" panose="020B0603020204020204" pitchFamily="34" charset="0"/>
-                <a:cs typeface="Arial" panose="020B0604020202020204" pitchFamily="34" charset="0"/>
-              </a:rPr>
-              <a:t>Gitaly</a:t>
-            </a:r>
-            <a:r>
               <a:rPr lang="en-US" altLang="en-US" sz="1100" dirty="0">
                 <a:latin typeface="Arial" panose="020B0604020202020204" pitchFamily="34" charset="0"/>
                 <a:ea typeface="Amazon Ember" panose="020B0603020204020204" pitchFamily="34" charset="0"/>
                 <a:cs typeface="Arial" panose="020B0604020202020204" pitchFamily="34" charset="0"/>
               </a:rPr>
-              <a:t> instance</a:t>
+              <a:t>Gitaly instance</a:t>
             </a:r>
           </a:p>
         </p:txBody>
@@ -8091,20 +8078,12 @@
           <a:p>
             <a:pPr algn="ctr" eaLnBrk="1" hangingPunct="1"/>
             <a:r>
-              <a:rPr lang="en-US" altLang="en-US" sz="1100" dirty="0" err="1">
-                <a:latin typeface="Arial" panose="020B0604020202020204" pitchFamily="34" charset="0"/>
-                <a:ea typeface="Amazon Ember" panose="020B0603020204020204" pitchFamily="34" charset="0"/>
-                <a:cs typeface="Arial" panose="020B0604020202020204" pitchFamily="34" charset="0"/>
-              </a:rPr>
-              <a:t>Gitaly</a:t>
-            </a:r>
-            <a:r>
               <a:rPr lang="en-US" altLang="en-US" sz="1100" dirty="0">
                 <a:latin typeface="Arial" panose="020B0604020202020204" pitchFamily="34" charset="0"/>
                 <a:ea typeface="Amazon Ember" panose="020B0603020204020204" pitchFamily="34" charset="0"/>
                 <a:cs typeface="Arial" panose="020B0604020202020204" pitchFamily="34" charset="0"/>
               </a:rPr>
-              <a:t> instance</a:t>
+              <a:t>Gitaly instance</a:t>
             </a:r>
           </a:p>
         </p:txBody>
@@ -8280,7 +8259,7 @@
         </p:blipFill>
         <p:spPr bwMode="auto">
           <a:xfrm>
-            <a:off x="11252577" y="2168434"/>
+            <a:off x="11252577" y="2284546"/>
             <a:ext cx="762000" cy="762000"/>
           </a:xfrm>
           <a:prstGeom prst="rect">
@@ -8327,7 +8306,7 @@
         </p:nvSpPr>
         <p:spPr bwMode="auto">
           <a:xfrm>
-            <a:off x="10770374" y="2930434"/>
+            <a:off x="10770374" y="3073494"/>
             <a:ext cx="1726405" cy="276999"/>
           </a:xfrm>
           <a:prstGeom prst="rect">
@@ -8501,7 +8480,7 @@
         </p:blipFill>
         <p:spPr bwMode="auto">
           <a:xfrm>
-            <a:off x="11252577" y="3456740"/>
+            <a:off x="11252577" y="3714024"/>
             <a:ext cx="762000" cy="762000"/>
           </a:xfrm>
           <a:prstGeom prst="rect">
@@ -8548,7 +8527,7 @@
         </p:nvSpPr>
         <p:spPr bwMode="auto">
           <a:xfrm>
-            <a:off x="10770374" y="4218740"/>
+            <a:off x="10770374" y="4485012"/>
             <a:ext cx="1726404" cy="276999"/>
           </a:xfrm>
           <a:prstGeom prst="rect">
@@ -8693,66 +8672,6 @@
           </a:p>
         </p:txBody>
       </p:sp>
-      <p:pic>
-        <p:nvPicPr>
-          <p:cNvPr id="98" name="Graphic 21">
-            <a:extLst>
-              <a:ext uri="{FF2B5EF4-FFF2-40B4-BE49-F238E27FC236}">
-                <a16:creationId xmlns:a16="http://schemas.microsoft.com/office/drawing/2014/main" id="{1E6AE739-5D99-4FB5-8B49-976E188C6F2A}"/>
-              </a:ext>
-            </a:extLst>
-          </p:cNvPr>
-          <p:cNvPicPr>
-            <a:picLocks noChangeAspect="1" noChangeArrowheads="1"/>
-          </p:cNvPicPr>
-          <p:nvPr/>
-        </p:nvPicPr>
-        <p:blipFill>
-          <a:blip r:embed="rId22">
-            <a:extLst>
-              <a:ext uri="{28A0092B-C50C-407E-A947-70E740481C1C}">
-                <a14:useLocalDpi xmlns:a14="http://schemas.microsoft.com/office/drawing/2010/main" val="0"/>
-              </a:ext>
-            </a:extLst>
-          </a:blip>
-          <a:srcRect/>
-          <a:stretch>
-            <a:fillRect/>
-          </a:stretch>
-        </p:blipFill>
-        <p:spPr bwMode="auto">
-          <a:xfrm>
-            <a:off x="11248615" y="4745046"/>
-            <a:ext cx="762000" cy="762000"/>
-          </a:xfrm>
-          <a:prstGeom prst="rect">
-            <a:avLst/>
-          </a:prstGeom>
-          <a:noFill/>
-          <a:ln>
-            <a:noFill/>
-          </a:ln>
-          <a:extLst>
-            <a:ext uri="{909E8E84-426E-40DD-AFC4-6F175D3DCCD1}">
-              <a14:hiddenFill xmlns:a14="http://schemas.microsoft.com/office/drawing/2010/main">
-                <a:solidFill>
-                  <a:srgbClr val="FFFFFF"/>
-                </a:solidFill>
-              </a14:hiddenFill>
-            </a:ext>
-            <a:ext uri="{91240B29-F687-4F45-9708-019B960494DF}">
-              <a14:hiddenLine xmlns:a14="http://schemas.microsoft.com/office/drawing/2010/main" w="9525">
-                <a:solidFill>
-                  <a:srgbClr val="000000"/>
-                </a:solidFill>
-                <a:miter lim="800000"/>
-                <a:headEnd/>
-                <a:tailEnd/>
-              </a14:hiddenLine>
-            </a:ext>
-          </a:extLst>
-        </p:spPr>
-      </p:pic>
       <p:sp>
         <p:nvSpPr>
           <p:cNvPr id="99" name="TextBox 12">
@@ -8769,7 +8688,7 @@
         </p:nvSpPr>
         <p:spPr bwMode="auto">
           <a:xfrm>
-            <a:off x="10768969" y="5502637"/>
+            <a:off x="10768969" y="5848032"/>
             <a:ext cx="1726404" cy="276999"/>
           </a:xfrm>
           <a:prstGeom prst="rect">
@@ -8929,7 +8848,7 @@
           <p:nvPr/>
         </p:nvPicPr>
         <p:blipFill>
-          <a:blip r:embed="rId23">
+          <a:blip r:embed="rId22">
             <a:extLst>
               <a:ext uri="{28A0092B-C50C-407E-A947-70E740481C1C}">
                 <a14:useLocalDpi xmlns:a14="http://schemas.microsoft.com/office/drawing/2010/main" val="0"/>
@@ -8943,7 +8862,7 @@
         </p:blipFill>
         <p:spPr bwMode="auto">
           <a:xfrm>
-            <a:off x="11248615" y="6028297"/>
+            <a:off x="11248615" y="6511056"/>
             <a:ext cx="762000" cy="762000"/>
           </a:xfrm>
           <a:prstGeom prst="rect">
@@ -8990,7 +8909,7 @@
         </p:nvSpPr>
         <p:spPr bwMode="auto">
           <a:xfrm>
-            <a:off x="10762451" y="6785888"/>
+            <a:off x="10762451" y="7306827"/>
             <a:ext cx="1726404" cy="461665"/>
           </a:xfrm>
           <a:prstGeom prst="rect">
@@ -9165,10 +9084,10 @@
           <p:nvPr/>
         </p:nvPicPr>
         <p:blipFill>
-          <a:blip r:embed="rId24">
+          <a:blip r:embed="rId23">
             <a:extLst>
               <a:ext uri="{96DAC541-7B7A-43D3-8B79-37D633B846F1}">
-                <asvg:svgBlip xmlns:asvg="http://schemas.microsoft.com/office/drawing/2016/SVG/main" r:embed="rId25"/>
+                <asvg:svgBlip xmlns:asvg="http://schemas.microsoft.com/office/drawing/2016/SVG/main" r:embed="rId24"/>
               </a:ext>
             </a:extLst>
           </a:blip>
@@ -9177,7 +9096,7 @@
         </p:blipFill>
         <p:spPr bwMode="auto">
           <a:xfrm>
-            <a:off x="11251171" y="7302730"/>
+            <a:off x="11251171" y="8172907"/>
             <a:ext cx="762000" cy="762000"/>
           </a:xfrm>
           <a:prstGeom prst="rect">
@@ -9224,7 +9143,7 @@
         </p:nvSpPr>
         <p:spPr bwMode="auto">
           <a:xfrm>
-            <a:off x="11075027" y="8064730"/>
+            <a:off x="11075027" y="8953422"/>
             <a:ext cx="1109175" cy="276999"/>
           </a:xfrm>
           <a:prstGeom prst="rect">
@@ -9387,7 +9306,7 @@
           <p:nvPr/>
         </p:nvPicPr>
         <p:blipFill>
-          <a:blip r:embed="rId26">
+          <a:blip r:embed="rId25">
             <a:extLst>
               <a:ext uri="{28A0092B-C50C-407E-A947-70E740481C1C}">
                 <a14:useLocalDpi xmlns:a14="http://schemas.microsoft.com/office/drawing/2010/main" val="0"/>
@@ -9401,7 +9320,7 @@
         </p:blipFill>
         <p:spPr bwMode="auto">
           <a:xfrm>
-            <a:off x="11251171" y="8596091"/>
+            <a:off x="11251171" y="9607829"/>
             <a:ext cx="762000" cy="762000"/>
           </a:xfrm>
           <a:prstGeom prst="rect">
@@ -9448,7 +9367,7 @@
         </p:nvSpPr>
         <p:spPr bwMode="auto">
           <a:xfrm>
-            <a:off x="10762452" y="9361620"/>
+            <a:off x="10762452" y="10400103"/>
             <a:ext cx="1726404" cy="276999"/>
           </a:xfrm>
           <a:prstGeom prst="rect">
@@ -9608,7 +9527,7 @@
           <p:nvPr/>
         </p:nvPicPr>
         <p:blipFill>
-          <a:blip r:embed="rId27">
+          <a:blip r:embed="rId26">
             <a:extLst>
               <a:ext uri="{28A0092B-C50C-407E-A947-70E740481C1C}">
                 <a14:useLocalDpi xmlns:a14="http://schemas.microsoft.com/office/drawing/2010/main" val="0"/>
@@ -9622,7 +9541,7 @@
         </p:blipFill>
         <p:spPr bwMode="auto">
           <a:xfrm>
-            <a:off x="11244653" y="9886496"/>
+            <a:off x="11244653" y="11121354"/>
             <a:ext cx="762000" cy="762000"/>
           </a:xfrm>
           <a:prstGeom prst="rect">
@@ -9669,7 +9588,7 @@
         </p:nvSpPr>
         <p:spPr bwMode="auto">
           <a:xfrm>
-            <a:off x="10768968" y="10651673"/>
+            <a:off x="10768968" y="11912321"/>
             <a:ext cx="1726405" cy="461665"/>
           </a:xfrm>
           <a:prstGeom prst="rect">
@@ -9829,13 +9748,13 @@
           <p:nvPr/>
         </p:nvPicPr>
         <p:blipFill>
-          <a:blip r:embed="rId28"/>
+          <a:blip r:embed="rId27"/>
           <a:srcRect/>
           <a:stretch/>
         </p:blipFill>
         <p:spPr bwMode="auto">
           <a:xfrm>
-            <a:off x="11244653" y="11155912"/>
+            <a:off x="11244653" y="12781598"/>
             <a:ext cx="762000" cy="762000"/>
           </a:xfrm>
           <a:prstGeom prst="rect">
@@ -9882,7 +9801,7 @@
         </p:nvSpPr>
         <p:spPr bwMode="auto">
           <a:xfrm>
-            <a:off x="10768968" y="11917912"/>
+            <a:off x="10768968" y="13592020"/>
             <a:ext cx="1726404" cy="276999"/>
           </a:xfrm>
           <a:prstGeom prst="rect">
@@ -10027,6 +9946,64 @@
           </a:p>
         </p:txBody>
       </p:sp>
+      <p:pic>
+        <p:nvPicPr>
+          <p:cNvPr id="82" name="Graphic 27">
+            <a:extLst>
+              <a:ext uri="{FF2B5EF4-FFF2-40B4-BE49-F238E27FC236}">
+                <a16:creationId xmlns:a16="http://schemas.microsoft.com/office/drawing/2014/main" id="{7E327BBB-3A86-EC4E-BAA7-B5712DD43F12}"/>
+              </a:ext>
+            </a:extLst>
+          </p:cNvPr>
+          <p:cNvPicPr>
+            <a:picLocks noChangeAspect="1" noChangeArrowheads="1"/>
+          </p:cNvPicPr>
+          <p:nvPr/>
+        </p:nvPicPr>
+        <p:blipFill>
+          <a:blip r:embed="rId28">
+            <a:extLst>
+              <a:ext uri="{96DAC541-7B7A-43D3-8B79-37D633B846F1}">
+                <asvg:svgBlip xmlns:asvg="http://schemas.microsoft.com/office/drawing/2016/SVG/main" r:embed="rId29"/>
+              </a:ext>
+            </a:extLst>
+          </a:blip>
+          <a:srcRect/>
+          <a:stretch/>
+        </p:blipFill>
+        <p:spPr bwMode="auto">
+          <a:xfrm>
+            <a:off x="11251171" y="5084509"/>
+            <a:ext cx="761999" cy="761999"/>
+          </a:xfrm>
+          <a:prstGeom prst="rect">
+            <a:avLst/>
+          </a:prstGeom>
+          <a:noFill/>
+          <a:ln>
+            <a:noFill/>
+          </a:ln>
+          <a:extLst>
+            <a:ext uri="{909E8E84-426E-40DD-AFC4-6F175D3DCCD1}">
+              <a14:hiddenFill xmlns:a14="http://schemas.microsoft.com/office/drawing/2010/main">
+                <a:solidFill>
+                  <a:srgbClr val="FFFFFF"/>
+                </a:solidFill>
+              </a14:hiddenFill>
+            </a:ext>
+            <a:ext uri="{91240B29-F687-4F45-9708-019B960494DF}">
+              <a14:hiddenLine xmlns:a14="http://schemas.microsoft.com/office/drawing/2010/main" w="9525">
+                <a:solidFill>
+                  <a:srgbClr val="000000"/>
+                </a:solidFill>
+                <a:miter lim="800000"/>
+                <a:headEnd/>
+                <a:tailEnd/>
+              </a14:hiddenLine>
+            </a:ext>
+          </a:extLst>
+        </p:spPr>
+      </p:pic>
     </p:spTree>
     <p:extLst>
       <p:ext uri="{BB962C8B-B14F-4D97-AF65-F5344CB8AC3E}">

</xml_diff>

<commit_message>
Replaced diagram and powerpoint
</commit_message>
<xml_diff>
--- a/docs/deployment_guide/images/architecture_diagram.pptx
+++ b/docs/deployment_guide/images/architecture_diagram.pptx
@@ -254,7 +254,7 @@
           <a:p>
             <a:fld id="{94264ADC-8C69-46B9-9183-D53300F41D68}" type="datetimeFigureOut">
               <a:rPr lang="en-US" smtClean="0"/>
-              <a:t>11/2/2022</a:t>
+              <a:t>11/4/2022</a:t>
             </a:fld>
             <a:endParaRPr lang="en-US"/>
           </a:p>
@@ -424,7 +424,7 @@
           <a:p>
             <a:fld id="{94264ADC-8C69-46B9-9183-D53300F41D68}" type="datetimeFigureOut">
               <a:rPr lang="en-US" smtClean="0"/>
-              <a:t>11/2/2022</a:t>
+              <a:t>11/4/2022</a:t>
             </a:fld>
             <a:endParaRPr lang="en-US"/>
           </a:p>
@@ -604,7 +604,7 @@
           <a:p>
             <a:fld id="{94264ADC-8C69-46B9-9183-D53300F41D68}" type="datetimeFigureOut">
               <a:rPr lang="en-US" smtClean="0"/>
-              <a:t>11/2/2022</a:t>
+              <a:t>11/4/2022</a:t>
             </a:fld>
             <a:endParaRPr lang="en-US"/>
           </a:p>
@@ -774,7 +774,7 @@
           <a:p>
             <a:fld id="{94264ADC-8C69-46B9-9183-D53300F41D68}" type="datetimeFigureOut">
               <a:rPr lang="en-US" smtClean="0"/>
-              <a:t>11/2/2022</a:t>
+              <a:t>11/4/2022</a:t>
             </a:fld>
             <a:endParaRPr lang="en-US"/>
           </a:p>
@@ -1018,7 +1018,7 @@
           <a:p>
             <a:fld id="{94264ADC-8C69-46B9-9183-D53300F41D68}" type="datetimeFigureOut">
               <a:rPr lang="en-US" smtClean="0"/>
-              <a:t>11/2/2022</a:t>
+              <a:t>11/4/2022</a:t>
             </a:fld>
             <a:endParaRPr lang="en-US"/>
           </a:p>
@@ -1250,7 +1250,7 @@
           <a:p>
             <a:fld id="{94264ADC-8C69-46B9-9183-D53300F41D68}" type="datetimeFigureOut">
               <a:rPr lang="en-US" smtClean="0"/>
-              <a:t>11/2/2022</a:t>
+              <a:t>11/4/2022</a:t>
             </a:fld>
             <a:endParaRPr lang="en-US"/>
           </a:p>
@@ -1617,7 +1617,7 @@
           <a:p>
             <a:fld id="{94264ADC-8C69-46B9-9183-D53300F41D68}" type="datetimeFigureOut">
               <a:rPr lang="en-US" smtClean="0"/>
-              <a:t>11/2/2022</a:t>
+              <a:t>11/4/2022</a:t>
             </a:fld>
             <a:endParaRPr lang="en-US"/>
           </a:p>
@@ -1735,7 +1735,7 @@
           <a:p>
             <a:fld id="{94264ADC-8C69-46B9-9183-D53300F41D68}" type="datetimeFigureOut">
               <a:rPr lang="en-US" smtClean="0"/>
-              <a:t>11/2/2022</a:t>
+              <a:t>11/4/2022</a:t>
             </a:fld>
             <a:endParaRPr lang="en-US"/>
           </a:p>
@@ -1830,7 +1830,7 @@
           <a:p>
             <a:fld id="{94264ADC-8C69-46B9-9183-D53300F41D68}" type="datetimeFigureOut">
               <a:rPr lang="en-US" smtClean="0"/>
-              <a:t>11/2/2022</a:t>
+              <a:t>11/4/2022</a:t>
             </a:fld>
             <a:endParaRPr lang="en-US"/>
           </a:p>
@@ -2107,7 +2107,7 @@
           <a:p>
             <a:fld id="{94264ADC-8C69-46B9-9183-D53300F41D68}" type="datetimeFigureOut">
               <a:rPr lang="en-US" smtClean="0"/>
-              <a:t>11/2/2022</a:t>
+              <a:t>11/4/2022</a:t>
             </a:fld>
             <a:endParaRPr lang="en-US"/>
           </a:p>
@@ -2364,7 +2364,7 @@
           <a:p>
             <a:fld id="{94264ADC-8C69-46B9-9183-D53300F41D68}" type="datetimeFigureOut">
               <a:rPr lang="en-US" smtClean="0"/>
-              <a:t>11/2/2022</a:t>
+              <a:t>11/4/2022</a:t>
             </a:fld>
             <a:endParaRPr lang="en-US"/>
           </a:p>
@@ -2577,7 +2577,7 @@
           <a:p>
             <a:fld id="{94264ADC-8C69-46B9-9183-D53300F41D68}" type="datetimeFigureOut">
               <a:rPr lang="en-US" smtClean="0"/>
-              <a:t>11/2/2022</a:t>
+              <a:t>11/4/2022</a:t>
             </a:fld>
             <a:endParaRPr lang="en-US"/>
           </a:p>
@@ -8688,7 +8688,7 @@
         </p:nvSpPr>
         <p:spPr bwMode="auto">
           <a:xfrm>
-            <a:off x="10768969" y="5848032"/>
+            <a:off x="10768969" y="5881282"/>
             <a:ext cx="1726404" cy="276999"/>
           </a:xfrm>
           <a:prstGeom prst="rect">
@@ -9948,10 +9948,10 @@
       </p:sp>
       <p:pic>
         <p:nvPicPr>
-          <p:cNvPr id="82" name="Graphic 27">
+          <p:cNvPr id="83" name="Graphic 21">
             <a:extLst>
               <a:ext uri="{FF2B5EF4-FFF2-40B4-BE49-F238E27FC236}">
-                <a16:creationId xmlns:a16="http://schemas.microsoft.com/office/drawing/2014/main" id="{7E327BBB-3A86-EC4E-BAA7-B5712DD43F12}"/>
+                <a16:creationId xmlns:a16="http://schemas.microsoft.com/office/drawing/2014/main" id="{2274BF0C-7782-4E49-BA18-B61AFF72E6DA}"/>
               </a:ext>
             </a:extLst>
           </p:cNvPr>
@@ -9963,18 +9963,20 @@
         <p:blipFill>
           <a:blip r:embed="rId28">
             <a:extLst>
-              <a:ext uri="{96DAC541-7B7A-43D3-8B79-37D633B846F1}">
-                <asvg:svgBlip xmlns:asvg="http://schemas.microsoft.com/office/drawing/2016/SVG/main" r:embed="rId29"/>
+              <a:ext uri="{28A0092B-C50C-407E-A947-70E740481C1C}">
+                <a14:useLocalDpi xmlns:a14="http://schemas.microsoft.com/office/drawing/2010/main" val="0"/>
               </a:ext>
             </a:extLst>
           </a:blip>
           <a:srcRect/>
-          <a:stretch/>
+          <a:stretch>
+            <a:fillRect/>
+          </a:stretch>
         </p:blipFill>
         <p:spPr bwMode="auto">
           <a:xfrm>
-            <a:off x="11251171" y="5084509"/>
-            <a:ext cx="761999" cy="761999"/>
+            <a:off x="11251170" y="5117691"/>
+            <a:ext cx="762000" cy="762000"/>
           </a:xfrm>
           <a:prstGeom prst="rect">
             <a:avLst/>

</xml_diff>